<commit_message>
Update SQL-developer+Analyst - EN.pptx
</commit_message>
<xml_diff>
--- a/SQL-developer+Analyst - EN.pptx
+++ b/SQL-developer+Analyst - EN.pptx
@@ -6117,7 +6117,7 @@
         </p:nvSpPr>
         <p:spPr>
           <a:xfrm>
-            <a:off x="517296" y="5977756"/>
+            <a:off x="498996" y="5749786"/>
             <a:ext cx="3076011" cy="239168"/>
           </a:xfrm>
           <a:prstGeom prst="rect">
@@ -6162,7 +6162,7 @@
         </p:nvCxnSpPr>
         <p:spPr>
           <a:xfrm>
-            <a:off x="356940" y="6255024"/>
+            <a:off x="338640" y="6027054"/>
             <a:ext cx="3562598" cy="0"/>
           </a:xfrm>
           <a:prstGeom prst="line">
@@ -6199,7 +6199,7 @@
         </p:nvSpPr>
         <p:spPr>
           <a:xfrm>
-            <a:off x="335937" y="5962887"/>
+            <a:off x="317637" y="5734917"/>
             <a:ext cx="181359" cy="226554"/>
           </a:xfrm>
           <a:prstGeom prst="smileyFace">
@@ -6260,7 +6260,7 @@
         </p:nvSpPr>
         <p:spPr>
           <a:xfrm>
-            <a:off x="327071" y="6383818"/>
+            <a:off x="308771" y="6155848"/>
             <a:ext cx="3562598" cy="553998"/>
           </a:xfrm>
           <a:prstGeom prst="rect">
@@ -6611,6 +6611,21 @@
 </file>
 
 <file path=customXml/item1.xml><?xml version="1.0" encoding="utf-8"?>
+<p:properties xmlns:p="http://schemas.microsoft.com/office/2006/metadata/properties" xmlns:xsi="http://www.w3.org/2001/XMLSchema-instance" xmlns:pc="http://schemas.microsoft.com/office/infopath/2007/PartnerControls">
+  <documentManagement/>
+</p:properties>
+</file>
+
+<file path=customXml/item2.xml><?xml version="1.0" encoding="utf-8"?>
+<?mso-contentType ?>
+<FormTemplates xmlns="http://schemas.microsoft.com/sharepoint/v3/contenttype/forms">
+  <Display>DocumentLibraryForm</Display>
+  <Edit>DocumentLibraryForm</Edit>
+  <New>DocumentLibraryForm</New>
+</FormTemplates>
+</file>
+
+<file path=customXml/item3.xml><?xml version="1.0" encoding="utf-8"?>
 <ct:contentTypeSchema xmlns:ct="http://schemas.microsoft.com/office/2006/metadata/contentType" xmlns:ma="http://schemas.microsoft.com/office/2006/metadata/properties/metaAttributes" ct:_="" ma:_="" ma:contentTypeName="Document" ma:contentTypeID="0x0101000C4D53E099F504499BC36358533F9BA8" ma:contentTypeVersion="7" ma:contentTypeDescription="Create a new document." ma:contentTypeScope="" ma:versionID="37b998167c53fd93bd8a81146372986a">
   <xsd:schema xmlns:xsd="http://www.w3.org/2001/XMLSchema" xmlns:xs="http://www.w3.org/2001/XMLSchema" xmlns:p="http://schemas.microsoft.com/office/2006/metadata/properties" xmlns:ns2="b9ce32c4-95f2-4d8d-90b3-2ec7014217e4" targetNamespace="http://schemas.microsoft.com/office/2006/metadata/properties" ma:root="true" ma:fieldsID="16190a445bae1f007f55c7f7a0ec3e2e" ns2:_="">
     <xsd:import namespace="b9ce32c4-95f2-4d8d-90b3-2ec7014217e4"/>
@@ -6774,22 +6789,31 @@
 </ct:contentTypeSchema>
 </file>
 
-<file path=customXml/item2.xml><?xml version="1.0" encoding="utf-8"?>
-<?mso-contentType ?>
-<FormTemplates xmlns="http://schemas.microsoft.com/sharepoint/v3/contenttype/forms">
-  <Display>DocumentLibraryForm</Display>
-  <Edit>DocumentLibraryForm</Edit>
-  <New>DocumentLibraryForm</New>
-</FormTemplates>
+<file path=customXml/itemProps1.xml><?xml version="1.0" encoding="utf-8"?>
+<ds:datastoreItem xmlns:ds="http://schemas.openxmlformats.org/officeDocument/2006/customXml" ds:itemID="{DB8C60B4-3884-4948-8DAC-4F73DA3FC04F}">
+  <ds:schemaRefs>
+    <ds:schemaRef ds:uri="http://www.w3.org/XML/1998/namespace"/>
+    <ds:schemaRef ds:uri="48d19d8f-480e-4d02-8bf9-dbdd12270516"/>
+    <ds:schemaRef ds:uri="http://purl.org/dc/dcmitype/"/>
+    <ds:schemaRef ds:uri="http://schemas.microsoft.com/office/infopath/2007/PartnerControls"/>
+    <ds:schemaRef ds:uri="http://purl.org/dc/elements/1.1/"/>
+    <ds:schemaRef ds:uri="http://schemas.openxmlformats.org/package/2006/metadata/core-properties"/>
+    <ds:schemaRef ds:uri="http://schemas.microsoft.com/office/2006/documentManagement/types"/>
+    <ds:schemaRef ds:uri="http://schemas.microsoft.com/office/2006/metadata/properties"/>
+    <ds:schemaRef ds:uri="http://purl.org/dc/terms/"/>
+  </ds:schemaRefs>
+</ds:datastoreItem>
 </file>
 
-<file path=customXml/item3.xml><?xml version="1.0" encoding="utf-8"?>
-<p:properties xmlns:p="http://schemas.microsoft.com/office/2006/metadata/properties" xmlns:xsi="http://www.w3.org/2001/XMLSchema-instance" xmlns:pc="http://schemas.microsoft.com/office/infopath/2007/PartnerControls">
-  <documentManagement/>
-</p:properties>
+<file path=customXml/itemProps2.xml><?xml version="1.0" encoding="utf-8"?>
+<ds:datastoreItem xmlns:ds="http://schemas.openxmlformats.org/officeDocument/2006/customXml" ds:itemID="{6080E5F6-089B-41C5-A197-67DC6BA0A43E}">
+  <ds:schemaRefs>
+    <ds:schemaRef ds:uri="http://schemas.microsoft.com/sharepoint/v3/contenttype/forms"/>
+  </ds:schemaRefs>
+</ds:datastoreItem>
 </file>
 
-<file path=customXml/itemProps1.xml><?xml version="1.0" encoding="utf-8"?>
+<file path=customXml/itemProps3.xml><?xml version="1.0" encoding="utf-8"?>
 <ds:datastoreItem xmlns:ds="http://schemas.openxmlformats.org/officeDocument/2006/customXml" ds:itemID="{24E008A8-E12E-4451-AF5D-2124BC95CA40}">
   <ds:schemaRefs>
     <ds:schemaRef ds:uri="http://schemas.microsoft.com/office/2006/metadata/contentType"/>
@@ -6805,28 +6829,4 @@
     <ds:schemaRef ds:uri="http://schemas.microsoft.com/internal/obd"/>
   </ds:schemaRefs>
 </ds:datastoreItem>
-</file>
-
-<file path=customXml/itemProps2.xml><?xml version="1.0" encoding="utf-8"?>
-<ds:datastoreItem xmlns:ds="http://schemas.openxmlformats.org/officeDocument/2006/customXml" ds:itemID="{6080E5F6-089B-41C5-A197-67DC6BA0A43E}">
-  <ds:schemaRefs>
-    <ds:schemaRef ds:uri="http://schemas.microsoft.com/sharepoint/v3/contenttype/forms"/>
-  </ds:schemaRefs>
-</ds:datastoreItem>
-</file>
-
-<file path=customXml/itemProps3.xml><?xml version="1.0" encoding="utf-8"?>
-<ds:datastoreItem xmlns:ds="http://schemas.openxmlformats.org/officeDocument/2006/customXml" ds:itemID="{DB8C60B4-3884-4948-8DAC-4F73DA3FC04F}">
-  <ds:schemaRefs>
-    <ds:schemaRef ds:uri="http://www.w3.org/XML/1998/namespace"/>
-    <ds:schemaRef ds:uri="48d19d8f-480e-4d02-8bf9-dbdd12270516"/>
-    <ds:schemaRef ds:uri="http://purl.org/dc/dcmitype/"/>
-    <ds:schemaRef ds:uri="http://schemas.microsoft.com/office/infopath/2007/PartnerControls"/>
-    <ds:schemaRef ds:uri="http://purl.org/dc/elements/1.1/"/>
-    <ds:schemaRef ds:uri="http://schemas.openxmlformats.org/package/2006/metadata/core-properties"/>
-    <ds:schemaRef ds:uri="http://schemas.microsoft.com/office/2006/documentManagement/types"/>
-    <ds:schemaRef ds:uri="http://schemas.microsoft.com/office/2006/metadata/properties"/>
-    <ds:schemaRef ds:uri="http://purl.org/dc/terms/"/>
-  </ds:schemaRefs>
-</ds:datastoreItem>
 </file>
</xml_diff>